<commit_message>
Simple refactor of delete
Simple refactor of delete sorted tree node algorithm
</commit_message>
<xml_diff>
--- a/ppt/dataStructure.pptx
+++ b/ppt/dataStructure.pptx
@@ -130,7 +130,7 @@
 <file path=ppt/revisionInfo.xml><?xml version="1.0" encoding="utf-8"?>
 <p1510:revInfo xmlns:a="http://schemas.openxmlformats.org/drawingml/2006/main" xmlns:r="http://schemas.openxmlformats.org/officeDocument/2006/relationships" xmlns:p1510="http://schemas.microsoft.com/office/powerpoint/2015/10/main">
   <p1510:revLst>
-    <p1510:client id="{16A1F63C-915B-4903-AE89-AEEAD78C541A}" v="244" dt="2025-08-24T10:03:20.703"/>
+    <p1510:client id="{16A1F63C-915B-4903-AE89-AEEAD78C541A}" v="245" dt="2025-08-24T15:18:21.907"/>
   </p1510:revLst>
 </p1510:revInfo>
 </file>
@@ -140,7 +140,7 @@
   <pc:docChgLst>
     <pc:chgData name="Sanders Wang" userId="089d73b8-785c-4012-b931-81c632b6c9c7" providerId="ADAL" clId="{16A1F63C-915B-4903-AE89-AEEAD78C541A}"/>
     <pc:docChg chg="undo custSel addSld modSld sldOrd">
-      <pc:chgData name="Sanders Wang" userId="089d73b8-785c-4012-b931-81c632b6c9c7" providerId="ADAL" clId="{16A1F63C-915B-4903-AE89-AEEAD78C541A}" dt="2025-08-24T10:03:41.217" v="2274" actId="1076"/>
+      <pc:chgData name="Sanders Wang" userId="089d73b8-785c-4012-b931-81c632b6c9c7" providerId="ADAL" clId="{16A1F63C-915B-4903-AE89-AEEAD78C541A}" dt="2025-08-24T15:18:27.598" v="2285" actId="20577"/>
       <pc:docMkLst>
         <pc:docMk/>
       </pc:docMkLst>
@@ -884,11 +884,19 @@
         </pc:cxnChg>
       </pc:sldChg>
       <pc:sldChg chg="addSp modSp new mod">
-        <pc:chgData name="Sanders Wang" userId="089d73b8-785c-4012-b931-81c632b6c9c7" providerId="ADAL" clId="{16A1F63C-915B-4903-AE89-AEEAD78C541A}" dt="2025-08-23T14:08:40.237" v="1534" actId="1076"/>
+        <pc:chgData name="Sanders Wang" userId="089d73b8-785c-4012-b931-81c632b6c9c7" providerId="ADAL" clId="{16A1F63C-915B-4903-AE89-AEEAD78C541A}" dt="2025-08-24T15:18:27.598" v="2285" actId="20577"/>
         <pc:sldMkLst>
           <pc:docMk/>
           <pc:sldMk cId="22587799" sldId="261"/>
         </pc:sldMkLst>
+        <pc:spChg chg="add mod">
+          <ac:chgData name="Sanders Wang" userId="089d73b8-785c-4012-b931-81c632b6c9c7" providerId="ADAL" clId="{16A1F63C-915B-4903-AE89-AEEAD78C541A}" dt="2025-08-24T15:18:27.598" v="2285" actId="20577"/>
+          <ac:spMkLst>
+            <pc:docMk/>
+            <pc:sldMk cId="22587799" sldId="261"/>
+            <ac:spMk id="2" creationId="{F2816F7C-C0DB-6A61-94BE-ABEAF71CBAC0}"/>
+          </ac:spMkLst>
+        </pc:spChg>
         <pc:spChg chg="add mod">
           <ac:chgData name="Sanders Wang" userId="089d73b8-785c-4012-b931-81c632b6c9c7" providerId="ADAL" clId="{16A1F63C-915B-4903-AE89-AEEAD78C541A}" dt="2025-08-23T14:06:56.137" v="1367" actId="113"/>
           <ac:spMkLst>
@@ -7973,8 +7981,8 @@
           </a:p>
         </p:txBody>
       </p:sp>
-      <mc:AlternateContent xmlns:mc="http://schemas.openxmlformats.org/markup-compatibility/2006">
-        <mc:Choice xmlns:a14="http://schemas.microsoft.com/office/drawing/2010/main" Requires="a14">
+      <mc:AlternateContent xmlns:mc="http://schemas.openxmlformats.org/markup-compatibility/2006" xmlns:a14="http://schemas.microsoft.com/office/drawing/2010/main">
+        <mc:Choice Requires="a14">
           <p:sp>
             <p:nvSpPr>
               <p:cNvPr id="43" name="TextBox 42">
@@ -8003,6 +8011,7 @@
               </a:bodyPr>
               <a:lstStyle/>
               <a:p>
+                <a:pPr/>
                 <a14:m>
                   <m:oMathPara xmlns:m="http://schemas.openxmlformats.org/officeDocument/2006/math">
                     <m:oMathParaPr>
@@ -8109,7 +8118,7 @@
             </p:txBody>
           </p:sp>
         </mc:Choice>
-        <mc:Fallback>
+        <mc:Fallback xmlns="">
           <p:sp>
             <p:nvSpPr>
               <p:cNvPr id="43" name="TextBox 42">
@@ -8154,8 +8163,8 @@
           </p:sp>
         </mc:Fallback>
       </mc:AlternateContent>
-      <mc:AlternateContent xmlns:mc="http://schemas.openxmlformats.org/markup-compatibility/2006">
-        <mc:Choice xmlns:a14="http://schemas.microsoft.com/office/drawing/2010/main" Requires="a14">
+      <mc:AlternateContent xmlns:mc="http://schemas.openxmlformats.org/markup-compatibility/2006" xmlns:a14="http://schemas.microsoft.com/office/drawing/2010/main">
+        <mc:Choice Requires="a14">
           <p:sp>
             <p:nvSpPr>
               <p:cNvPr id="46" name="TextBox 45">
@@ -8184,6 +8193,7 @@
               </a:bodyPr>
               <a:lstStyle/>
               <a:p>
+                <a:pPr/>
                 <a14:m>
                   <m:oMathPara xmlns:m="http://schemas.openxmlformats.org/officeDocument/2006/math">
                     <m:oMathParaPr>
@@ -8290,7 +8300,7 @@
             </p:txBody>
           </p:sp>
         </mc:Choice>
-        <mc:Fallback>
+        <mc:Fallback xmlns="">
           <p:sp>
             <p:nvSpPr>
               <p:cNvPr id="46" name="TextBox 45">
@@ -8475,8 +8485,8 @@
           </a:p>
         </p:txBody>
       </p:sp>
-      <mc:AlternateContent xmlns:mc="http://schemas.openxmlformats.org/markup-compatibility/2006">
-        <mc:Choice xmlns:a14="http://schemas.microsoft.com/office/drawing/2010/main" Requires="a14">
+      <mc:AlternateContent xmlns:mc="http://schemas.openxmlformats.org/markup-compatibility/2006" xmlns:a14="http://schemas.microsoft.com/office/drawing/2010/main">
+        <mc:Choice Requires="a14">
           <p:sp>
             <p:nvSpPr>
               <p:cNvPr id="53" name="TextBox 52">
@@ -8505,6 +8515,7 @@
               </a:bodyPr>
               <a:lstStyle/>
               <a:p>
+                <a:pPr/>
                 <a14:m>
                   <m:oMathPara xmlns:m="http://schemas.openxmlformats.org/officeDocument/2006/math">
                     <m:oMathParaPr>
@@ -8630,7 +8641,7 @@
             </p:txBody>
           </p:sp>
         </mc:Choice>
-        <mc:Fallback>
+        <mc:Fallback xmlns="">
           <p:sp>
             <p:nvSpPr>
               <p:cNvPr id="53" name="TextBox 52">
@@ -13178,6 +13189,41 @@
             <a:r>
               <a:rPr lang="en-US" b="1" dirty="0"/>
               <a:t>There is no any child of the node to be deleted</a:t>
+            </a:r>
+          </a:p>
+        </p:txBody>
+      </p:sp>
+      <p:sp>
+        <p:nvSpPr>
+          <p:cNvPr id="2" name="TextBox 1">
+            <a:extLst>
+              <a:ext uri="{FF2B5EF4-FFF2-40B4-BE49-F238E27FC236}">
+                <a16:creationId xmlns:a16="http://schemas.microsoft.com/office/drawing/2014/main" id="{F2816F7C-C0DB-6A61-94BE-ABEAF71CBAC0}"/>
+              </a:ext>
+            </a:extLst>
+          </p:cNvPr>
+          <p:cNvSpPr txBox="1"/>
+          <p:nvPr/>
+        </p:nvSpPr>
+        <p:spPr>
+          <a:xfrm>
+            <a:off x="1426029" y="5965371"/>
+            <a:ext cx="763351" cy="369332"/>
+          </a:xfrm>
+          <a:prstGeom prst="rect">
+            <a:avLst/>
+          </a:prstGeom>
+          <a:noFill/>
+        </p:spPr>
+        <p:txBody>
+          <a:bodyPr wrap="none" rtlCol="0">
+            <a:spAutoFit/>
+          </a:bodyPr>
+          <a:lstStyle/>
+          <a:p>
+            <a:r>
+              <a:rPr lang="en-US" dirty="0"/>
+              <a:t>R:null</a:t>
             </a:r>
           </a:p>
         </p:txBody>

</xml_diff>